<commit_message>
Inserção do Bootstrap 4 e required nos inputs do form em transfer e login
Inserção do Bootstrap 4 - inserção em .angular-cli.json e nos packages.
Inserção de  required nos inputs do form em transfer e login
Alteração do favicon na pasta principal
</commit_message>
<xml_diff>
--- a/_assets/Estudo de Caso - Modelo Apresentação Pitch.pptx
+++ b/_assets/Estudo de Caso - Modelo Apresentação Pitch.pptx
@@ -7,44 +7,45 @@
     <p:sldMasterId id="2147483665" r:id="rId3"/>
   </p:sldMasterIdLst>
   <p:notesMasterIdLst>
-    <p:notesMasterId r:id="rId10"/>
+    <p:notesMasterId r:id="rId11"/>
   </p:notesMasterIdLst>
   <p:sldIdLst>
     <p:sldId id="256" r:id="rId4"/>
     <p:sldId id="259" r:id="rId5"/>
     <p:sldId id="260" r:id="rId6"/>
     <p:sldId id="261" r:id="rId7"/>
-    <p:sldId id="257" r:id="rId8"/>
-    <p:sldId id="258" r:id="rId9"/>
+    <p:sldId id="262" r:id="rId8"/>
+    <p:sldId id="257" r:id="rId9"/>
+    <p:sldId id="258" r:id="rId10"/>
   </p:sldIdLst>
   <p:sldSz cx="9144000" cy="6858000" type="screen4x3"/>
   <p:notesSz cx="6858000" cy="9144000"/>
   <p:embeddedFontLst>
     <p:embeddedFont>
       <p:font typeface="Helvetica Neue" panose="020B0604020202020204" charset="0"/>
-      <p:regular r:id="rId11"/>
-      <p:bold r:id="rId12"/>
-      <p:italic r:id="rId13"/>
-      <p:boldItalic r:id="rId14"/>
+      <p:regular r:id="rId12"/>
+      <p:bold r:id="rId13"/>
+      <p:italic r:id="rId14"/>
+      <p:boldItalic r:id="rId15"/>
     </p:embeddedFont>
     <p:embeddedFont>
       <p:font typeface="Roboto" panose="020B0604020202020204" charset="0"/>
-      <p:regular r:id="rId15"/>
-      <p:bold r:id="rId16"/>
-      <p:italic r:id="rId17"/>
-      <p:boldItalic r:id="rId18"/>
+      <p:regular r:id="rId16"/>
+      <p:bold r:id="rId17"/>
+      <p:italic r:id="rId18"/>
+      <p:boldItalic r:id="rId19"/>
     </p:embeddedFont>
     <p:embeddedFont>
       <p:font typeface="Calibri" panose="020F0502020204030204" pitchFamily="34" charset="0"/>
-      <p:regular r:id="rId19"/>
-      <p:bold r:id="rId20"/>
-      <p:italic r:id="rId21"/>
-      <p:boldItalic r:id="rId22"/>
+      <p:regular r:id="rId20"/>
+      <p:bold r:id="rId21"/>
+      <p:italic r:id="rId22"/>
+      <p:boldItalic r:id="rId23"/>
     </p:embeddedFont>
     <p:embeddedFont>
       <p:font typeface="Roboto Black" panose="020B0604020202020204" charset="0"/>
-      <p:bold r:id="rId23"/>
-      <p:boldItalic r:id="rId24"/>
+      <p:bold r:id="rId24"/>
+      <p:boldItalic r:id="rId25"/>
     </p:embeddedFont>
   </p:embeddedFontLst>
   <p:defaultTextStyle>
@@ -1006,6 +1007,119 @@
   <p:cSld>
     <p:spTree>
       <p:nvGrpSpPr>
+        <p:cNvPr id="1" name="Shape 98"/>
+        <p:cNvGrpSpPr/>
+        <p:nvPr/>
+      </p:nvGrpSpPr>
+      <p:grpSpPr>
+        <a:xfrm>
+          <a:off x="0" y="0"/>
+          <a:ext cx="0" cy="0"/>
+          <a:chOff x="0" y="0"/>
+          <a:chExt cx="0" cy="0"/>
+        </a:xfrm>
+      </p:grpSpPr>
+      <p:sp>
+        <p:nvSpPr>
+          <p:cNvPr id="99" name="Shape 99"/>
+          <p:cNvSpPr txBox="1">
+            <a:spLocks noGrp="1"/>
+          </p:cNvSpPr>
+          <p:nvPr>
+            <p:ph type="body" idx="1"/>
+          </p:nvPr>
+        </p:nvSpPr>
+        <p:spPr>
+          <a:xfrm>
+            <a:off x="685800" y="4343400"/>
+            <a:ext cx="5486400" cy="4114800"/>
+          </a:xfrm>
+          <a:prstGeom prst="rect">
+            <a:avLst/>
+          </a:prstGeom>
+          <a:noFill/>
+          <a:ln>
+            <a:noFill/>
+          </a:ln>
+        </p:spPr>
+        <p:txBody>
+          <a:bodyPr spcFirstLastPara="1" wrap="square" lIns="91425" tIns="91425" rIns="91425" bIns="91425" anchor="ctr" anchorCtr="0">
+            <a:noAutofit/>
+          </a:bodyPr>
+          <a:lstStyle/>
+          <a:p>
+            <a:pPr marL="0" lvl="0" indent="0" rtl="0">
+              <a:spcBef>
+                <a:spcPts val="0"/>
+              </a:spcBef>
+              <a:spcAft>
+                <a:spcPts val="0"/>
+              </a:spcAft>
+              <a:buNone/>
+            </a:pPr>
+            <a:endParaRPr/>
+          </a:p>
+        </p:txBody>
+      </p:sp>
+      <p:sp>
+        <p:nvSpPr>
+          <p:cNvPr id="100" name="Shape 100"/>
+          <p:cNvSpPr>
+            <a:spLocks noGrp="1" noRot="1" noChangeAspect="1"/>
+          </p:cNvSpPr>
+          <p:nvPr>
+            <p:ph type="sldImg" idx="2"/>
+          </p:nvPr>
+        </p:nvSpPr>
+        <p:spPr>
+          <a:xfrm>
+            <a:off x="1143000" y="685800"/>
+            <a:ext cx="4572000" cy="3429000"/>
+          </a:xfrm>
+          <a:custGeom>
+            <a:avLst/>
+            <a:gdLst/>
+            <a:ahLst/>
+            <a:cxnLst/>
+            <a:rect l="0" t="0" r="0" b="0"/>
+            <a:pathLst>
+              <a:path w="120000" h="120000" extrusionOk="0">
+                <a:moveTo>
+                  <a:pt x="0" y="0"/>
+                </a:moveTo>
+                <a:lnTo>
+                  <a:pt x="120000" y="0"/>
+                </a:lnTo>
+                <a:lnTo>
+                  <a:pt x="120000" y="120000"/>
+                </a:lnTo>
+                <a:lnTo>
+                  <a:pt x="0" y="120000"/>
+                </a:lnTo>
+                <a:close/>
+              </a:path>
+            </a:pathLst>
+          </a:custGeom>
+        </p:spPr>
+      </p:sp>
+    </p:spTree>
+    <p:extLst>
+      <p:ext uri="{BB962C8B-B14F-4D97-AF65-F5344CB8AC3E}">
+        <p14:creationId xmlns:p14="http://schemas.microsoft.com/office/powerpoint/2010/main" val="1911482317"/>
+      </p:ext>
+    </p:extLst>
+  </p:cSld>
+  <p:clrMapOvr>
+    <a:masterClrMapping/>
+  </p:clrMapOvr>
+</p:notes>
+</file>
+
+<file path=ppt/notesSlides/notesSlide6.xml><?xml version="1.0" encoding="utf-8"?>
+<p:notes xmlns:a="http://schemas.openxmlformats.org/drawingml/2006/main" xmlns:r="http://schemas.openxmlformats.org/officeDocument/2006/relationships" xmlns:p="http://schemas.openxmlformats.org/presentationml/2006/main" showMasterSp="0" showMasterPhAnim="0">
+  <p:cSld>
+    <p:spTree>
+      <p:nvGrpSpPr>
         <p:cNvPr id="1" name="Shape 109"/>
         <p:cNvGrpSpPr/>
         <p:nvPr/>
@@ -1109,7 +1223,7 @@
 </p:notes>
 </file>
 
-<file path=ppt/notesSlides/notesSlide6.xml><?xml version="1.0" encoding="utf-8"?>
+<file path=ppt/notesSlides/notesSlide7.xml><?xml version="1.0" encoding="utf-8"?>
 <p:notes xmlns:a="http://schemas.openxmlformats.org/drawingml/2006/main" xmlns:r="http://schemas.openxmlformats.org/officeDocument/2006/relationships" xmlns:p="http://schemas.openxmlformats.org/presentationml/2006/main" showMasterSp="0" showMasterPhAnim="0">
   <p:cSld>
     <p:spTree>
@@ -13034,7 +13148,7 @@
           </a:bodyPr>
           <a:lstStyle/>
           <a:p>
-            <a:pPr marL="0" marR="0" lvl="1" indent="0" algn="r" rtl="0">
+            <a:pPr marL="0" marR="0" lvl="1" indent="0" algn="ctr" rtl="0">
               <a:lnSpc>
                 <a:spcPct val="100000"/>
               </a:lnSpc>
@@ -13739,7 +13853,7 @@
           </a:bodyPr>
           <a:lstStyle/>
           <a:p>
-            <a:pPr marL="0" marR="0" lvl="1" indent="0" algn="r" rtl="0">
+            <a:pPr marL="0" marR="0" lvl="1" indent="0" algn="ctr" rtl="0">
               <a:lnSpc>
                 <a:spcPct val="100000"/>
               </a:lnSpc>
@@ -14029,6 +14143,849 @@
 </file>
 
 <file path=ppt/slides/slide5.xml><?xml version="1.0" encoding="utf-8"?>
+<p:sld xmlns:a="http://schemas.openxmlformats.org/drawingml/2006/main" xmlns:r="http://schemas.openxmlformats.org/officeDocument/2006/relationships" xmlns:p="http://schemas.openxmlformats.org/presentationml/2006/main">
+  <p:cSld>
+    <p:spTree>
+      <p:nvGrpSpPr>
+        <p:cNvPr id="1" name="Shape 101"/>
+        <p:cNvGrpSpPr/>
+        <p:nvPr/>
+      </p:nvGrpSpPr>
+      <p:grpSpPr>
+        <a:xfrm>
+          <a:off x="0" y="0"/>
+          <a:ext cx="0" cy="0"/>
+          <a:chOff x="0" y="0"/>
+          <a:chExt cx="0" cy="0"/>
+        </a:xfrm>
+      </p:grpSpPr>
+      <p:pic>
+        <p:nvPicPr>
+          <p:cNvPr id="102" name="Shape 102"/>
+          <p:cNvPicPr preferRelativeResize="0"/>
+          <p:nvPr/>
+        </p:nvPicPr>
+        <p:blipFill rotWithShape="1">
+          <a:blip r:embed="rId3">
+            <a:alphaModFix/>
+          </a:blip>
+          <a:srcRect l="7776" r="3350"/>
+          <a:stretch/>
+        </p:blipFill>
+        <p:spPr>
+          <a:xfrm>
+            <a:off x="-1" y="0"/>
+            <a:ext cx="9144003" cy="6858002"/>
+          </a:xfrm>
+          <a:prstGeom prst="rect">
+            <a:avLst/>
+          </a:prstGeom>
+          <a:noFill/>
+          <a:ln>
+            <a:noFill/>
+          </a:ln>
+        </p:spPr>
+      </p:pic>
+      <p:sp>
+        <p:nvSpPr>
+          <p:cNvPr id="103" name="Shape 103"/>
+          <p:cNvSpPr/>
+          <p:nvPr/>
+        </p:nvSpPr>
+        <p:spPr>
+          <a:xfrm>
+            <a:off x="-12" y="0"/>
+            <a:ext cx="9144000" cy="6858000"/>
+          </a:xfrm>
+          <a:prstGeom prst="rect">
+            <a:avLst/>
+          </a:prstGeom>
+          <a:solidFill>
+            <a:schemeClr val="tx1">
+              <a:alpha val="85000"/>
+            </a:schemeClr>
+          </a:solidFill>
+          <a:ln w="9525" cap="flat" cmpd="sng">
+            <a:solidFill>
+              <a:schemeClr val="dk2"/>
+            </a:solidFill>
+            <a:prstDash val="solid"/>
+            <a:round/>
+            <a:headEnd type="none" w="med" len="med"/>
+            <a:tailEnd type="none" w="med" len="med"/>
+          </a:ln>
+        </p:spPr>
+        <p:txBody>
+          <a:bodyPr spcFirstLastPara="1" wrap="square" lIns="91425" tIns="91425" rIns="91425" bIns="91425" anchor="ctr" anchorCtr="0">
+            <a:noAutofit/>
+          </a:bodyPr>
+          <a:lstStyle/>
+          <a:p>
+            <a:pPr marL="0" lvl="0" indent="0">
+              <a:spcBef>
+                <a:spcPts val="0"/>
+              </a:spcBef>
+              <a:spcAft>
+                <a:spcPts val="0"/>
+              </a:spcAft>
+              <a:buNone/>
+            </a:pPr>
+            <a:endParaRPr/>
+          </a:p>
+        </p:txBody>
+      </p:sp>
+      <p:cxnSp>
+        <p:nvCxnSpPr>
+          <p:cNvPr id="104" name="Shape 104"/>
+          <p:cNvCxnSpPr/>
+          <p:nvPr/>
+        </p:nvCxnSpPr>
+        <p:spPr>
+          <a:xfrm>
+            <a:off x="2662312" y="261186"/>
+            <a:ext cx="10913" cy="524287"/>
+          </a:xfrm>
+          <a:prstGeom prst="straightConnector1">
+            <a:avLst/>
+          </a:prstGeom>
+          <a:noFill/>
+          <a:ln w="19050" cap="flat" cmpd="sng">
+            <a:solidFill>
+              <a:srgbClr val="FFFFFF"/>
+            </a:solidFill>
+            <a:prstDash val="solid"/>
+            <a:round/>
+            <a:headEnd type="none" w="med" len="med"/>
+            <a:tailEnd type="none" w="med" len="med"/>
+          </a:ln>
+        </p:spPr>
+      </p:cxnSp>
+      <p:pic>
+        <p:nvPicPr>
+          <p:cNvPr id="105" name="Shape 105"/>
+          <p:cNvPicPr preferRelativeResize="0"/>
+          <p:nvPr/>
+        </p:nvPicPr>
+        <p:blipFill rotWithShape="1">
+          <a:blip r:embed="rId4">
+            <a:alphaModFix/>
+          </a:blip>
+          <a:srcRect/>
+          <a:stretch/>
+        </p:blipFill>
+        <p:spPr>
+          <a:xfrm>
+            <a:off x="7200900" y="6277423"/>
+            <a:ext cx="1733129" cy="387052"/>
+          </a:xfrm>
+          <a:prstGeom prst="rect">
+            <a:avLst/>
+          </a:prstGeom>
+          <a:noFill/>
+          <a:ln>
+            <a:noFill/>
+          </a:ln>
+        </p:spPr>
+      </p:pic>
+      <p:sp>
+        <p:nvSpPr>
+          <p:cNvPr id="106" name="Shape 106"/>
+          <p:cNvSpPr txBox="1"/>
+          <p:nvPr/>
+        </p:nvSpPr>
+        <p:spPr>
+          <a:xfrm>
+            <a:off x="492727" y="276165"/>
+            <a:ext cx="1977728" cy="601897"/>
+          </a:xfrm>
+          <a:prstGeom prst="rect">
+            <a:avLst/>
+          </a:prstGeom>
+          <a:noFill/>
+          <a:ln>
+            <a:noFill/>
+          </a:ln>
+        </p:spPr>
+        <p:txBody>
+          <a:bodyPr spcFirstLastPara="1" wrap="square" lIns="82925" tIns="41450" rIns="82925" bIns="41450" anchor="t" anchorCtr="0">
+            <a:noAutofit/>
+          </a:bodyPr>
+          <a:lstStyle/>
+          <a:p>
+            <a:pPr marL="0" marR="0" lvl="1" indent="0" algn="ctr" rtl="0">
+              <a:lnSpc>
+                <a:spcPct val="100000"/>
+              </a:lnSpc>
+              <a:spcBef>
+                <a:spcPts val="0"/>
+              </a:spcBef>
+              <a:spcAft>
+                <a:spcPts val="0"/>
+              </a:spcAft>
+              <a:buClr>
+                <a:schemeClr val="lt1"/>
+              </a:buClr>
+              <a:buFont typeface="Arial"/>
+              <a:buNone/>
+            </a:pPr>
+            <a:r>
+              <a:rPr lang="pt-BR" sz="2800" b="1" dirty="0">
+                <a:solidFill>
+                  <a:schemeClr val="lt1"/>
+                </a:solidFill>
+                <a:latin typeface="Roboto"/>
+                <a:ea typeface="Roboto"/>
+                <a:cs typeface="Roboto"/>
+                <a:sym typeface="Roboto"/>
+              </a:rPr>
+              <a:t>Grupo </a:t>
+            </a:r>
+            <a:r>
+              <a:rPr lang="pt-BR" sz="2800" b="1" dirty="0" smtClean="0">
+                <a:solidFill>
+                  <a:schemeClr val="lt1"/>
+                </a:solidFill>
+                <a:latin typeface="Roboto"/>
+                <a:ea typeface="Roboto"/>
+                <a:cs typeface="Roboto"/>
+                <a:sym typeface="Roboto"/>
+              </a:rPr>
+              <a:t>3</a:t>
+            </a:r>
+            <a:endParaRPr sz="2800" b="1" dirty="0">
+              <a:solidFill>
+                <a:schemeClr val="lt1"/>
+              </a:solidFill>
+              <a:latin typeface="Roboto"/>
+              <a:ea typeface="Roboto"/>
+              <a:cs typeface="Roboto"/>
+              <a:sym typeface="Roboto"/>
+            </a:endParaRPr>
+          </a:p>
+        </p:txBody>
+      </p:sp>
+      <p:pic>
+        <p:nvPicPr>
+          <p:cNvPr id="107" name="Shape 107"/>
+          <p:cNvPicPr preferRelativeResize="0"/>
+          <p:nvPr/>
+        </p:nvPicPr>
+        <p:blipFill>
+          <a:blip r:embed="rId5">
+            <a:alphaModFix/>
+          </a:blip>
+          <a:stretch>
+            <a:fillRect/>
+          </a:stretch>
+        </p:blipFill>
+        <p:spPr>
+          <a:xfrm>
+            <a:off x="182671" y="6195535"/>
+            <a:ext cx="1427766" cy="523993"/>
+          </a:xfrm>
+          <a:prstGeom prst="rect">
+            <a:avLst/>
+          </a:prstGeom>
+          <a:noFill/>
+          <a:ln>
+            <a:noFill/>
+          </a:ln>
+        </p:spPr>
+      </p:pic>
+      <p:pic>
+        <p:nvPicPr>
+          <p:cNvPr id="108" name="Shape 108"/>
+          <p:cNvPicPr preferRelativeResize="0"/>
+          <p:nvPr/>
+        </p:nvPicPr>
+        <p:blipFill>
+          <a:blip r:embed="rId6">
+            <a:alphaModFix/>
+          </a:blip>
+          <a:stretch>
+            <a:fillRect/>
+          </a:stretch>
+        </p:blipFill>
+        <p:spPr>
+          <a:xfrm>
+            <a:off x="7200900" y="8"/>
+            <a:ext cx="1857828" cy="1045028"/>
+          </a:xfrm>
+          <a:prstGeom prst="rect">
+            <a:avLst/>
+          </a:prstGeom>
+          <a:noFill/>
+          <a:ln>
+            <a:noFill/>
+          </a:ln>
+        </p:spPr>
+      </p:pic>
+      <p:sp>
+        <p:nvSpPr>
+          <p:cNvPr id="9" name="Shape 106"/>
+          <p:cNvSpPr txBox="1"/>
+          <p:nvPr/>
+        </p:nvSpPr>
+        <p:spPr>
+          <a:xfrm>
+            <a:off x="2837180" y="327545"/>
+            <a:ext cx="4472766" cy="457928"/>
+          </a:xfrm>
+          <a:prstGeom prst="rect">
+            <a:avLst/>
+          </a:prstGeom>
+          <a:noFill/>
+          <a:ln>
+            <a:noFill/>
+          </a:ln>
+        </p:spPr>
+        <p:txBody>
+          <a:bodyPr spcFirstLastPara="1" wrap="square" lIns="82925" tIns="41450" rIns="82925" bIns="41450" anchor="t" anchorCtr="0">
+            <a:noAutofit/>
+          </a:bodyPr>
+          <a:lstStyle/>
+          <a:p>
+            <a:pPr marL="0" marR="0" lvl="1" indent="0" algn="ctr" rtl="0">
+              <a:lnSpc>
+                <a:spcPct val="100000"/>
+              </a:lnSpc>
+              <a:spcBef>
+                <a:spcPts val="0"/>
+              </a:spcBef>
+              <a:spcAft>
+                <a:spcPts val="0"/>
+              </a:spcAft>
+              <a:buClr>
+                <a:schemeClr val="lt1"/>
+              </a:buClr>
+              <a:buFont typeface="Arial"/>
+              <a:buNone/>
+            </a:pPr>
+            <a:r>
+              <a:rPr lang="pt-BR" sz="2000" dirty="0" smtClean="0">
+                <a:solidFill>
+                  <a:schemeClr val="lt1"/>
+                </a:solidFill>
+                <a:latin typeface="Roboto"/>
+                <a:ea typeface="Roboto"/>
+                <a:cs typeface="Roboto"/>
+                <a:sym typeface="Roboto"/>
+              </a:rPr>
+              <a:t>Estudo </a:t>
+            </a:r>
+            <a:r>
+              <a:rPr lang="pt-BR" sz="2000" dirty="0">
+                <a:solidFill>
+                  <a:schemeClr val="lt1"/>
+                </a:solidFill>
+                <a:latin typeface="Roboto"/>
+                <a:ea typeface="Roboto"/>
+                <a:cs typeface="Roboto"/>
+                <a:sym typeface="Roboto"/>
+              </a:rPr>
+              <a:t>de Caso </a:t>
+            </a:r>
+            <a:r>
+              <a:rPr lang="pt-BR" sz="2000" dirty="0" smtClean="0">
+                <a:solidFill>
+                  <a:schemeClr val="lt1"/>
+                </a:solidFill>
+                <a:latin typeface="Roboto"/>
+                <a:ea typeface="Roboto"/>
+                <a:cs typeface="Roboto"/>
+                <a:sym typeface="Roboto"/>
+              </a:rPr>
+              <a:t> - </a:t>
+            </a:r>
+            <a:r>
+              <a:rPr lang="pt-BR" sz="2000" b="1" dirty="0" smtClean="0">
+                <a:solidFill>
+                  <a:schemeClr val="lt1"/>
+                </a:solidFill>
+                <a:latin typeface="Roboto"/>
+                <a:ea typeface="Roboto"/>
+                <a:cs typeface="Roboto"/>
+                <a:sym typeface="Roboto"/>
+              </a:rPr>
+              <a:t>Internet </a:t>
+            </a:r>
+            <a:r>
+              <a:rPr lang="pt-BR" sz="2000" b="1" dirty="0">
+                <a:solidFill>
+                  <a:schemeClr val="lt1"/>
+                </a:solidFill>
+                <a:latin typeface="Roboto"/>
+                <a:ea typeface="Roboto"/>
+                <a:cs typeface="Roboto"/>
+                <a:sym typeface="Roboto"/>
+              </a:rPr>
+              <a:t>Banking</a:t>
+            </a:r>
+            <a:endParaRPr sz="2000" b="1" dirty="0">
+              <a:solidFill>
+                <a:schemeClr val="lt1"/>
+              </a:solidFill>
+              <a:latin typeface="Roboto"/>
+              <a:ea typeface="Roboto"/>
+              <a:cs typeface="Roboto"/>
+              <a:sym typeface="Roboto"/>
+            </a:endParaRPr>
+          </a:p>
+        </p:txBody>
+      </p:sp>
+      <p:sp>
+        <p:nvSpPr>
+          <p:cNvPr id="12" name="Shape 106"/>
+          <p:cNvSpPr txBox="1"/>
+          <p:nvPr/>
+        </p:nvSpPr>
+        <p:spPr>
+          <a:xfrm>
+            <a:off x="4640239" y="1154227"/>
+            <a:ext cx="3616656" cy="601897"/>
+          </a:xfrm>
+          <a:prstGeom prst="rect">
+            <a:avLst/>
+          </a:prstGeom>
+          <a:noFill/>
+          <a:ln>
+            <a:noFill/>
+          </a:ln>
+        </p:spPr>
+        <p:txBody>
+          <a:bodyPr spcFirstLastPara="1" wrap="square" lIns="82925" tIns="41450" rIns="82925" bIns="41450" anchor="t" anchorCtr="0">
+            <a:noAutofit/>
+          </a:bodyPr>
+          <a:lstStyle/>
+          <a:p>
+            <a:pPr marL="0" marR="0" lvl="1" indent="0" algn="r" rtl="0">
+              <a:lnSpc>
+                <a:spcPct val="100000"/>
+              </a:lnSpc>
+              <a:spcBef>
+                <a:spcPts val="0"/>
+              </a:spcBef>
+              <a:spcAft>
+                <a:spcPts val="0"/>
+              </a:spcAft>
+              <a:buClr>
+                <a:schemeClr val="lt1"/>
+              </a:buClr>
+              <a:buFont typeface="Arial"/>
+              <a:buNone/>
+            </a:pPr>
+            <a:r>
+              <a:rPr lang="pt-BR" sz="2800" b="1" dirty="0" smtClean="0">
+                <a:solidFill>
+                  <a:schemeClr val="lt1"/>
+                </a:solidFill>
+                <a:latin typeface="Roboto"/>
+                <a:ea typeface="Roboto"/>
+                <a:cs typeface="Roboto"/>
+                <a:sym typeface="Roboto"/>
+              </a:rPr>
+              <a:t>Banco de Dados</a:t>
+            </a:r>
+            <a:endParaRPr sz="2800" b="1" dirty="0">
+              <a:solidFill>
+                <a:schemeClr val="lt1"/>
+              </a:solidFill>
+              <a:latin typeface="Roboto"/>
+              <a:ea typeface="Roboto"/>
+              <a:cs typeface="Roboto"/>
+              <a:sym typeface="Roboto"/>
+            </a:endParaRPr>
+          </a:p>
+        </p:txBody>
+      </p:sp>
+      <p:sp>
+        <p:nvSpPr>
+          <p:cNvPr id="4" name="CaixaDeTexto 3"/>
+          <p:cNvSpPr txBox="1"/>
+          <p:nvPr/>
+        </p:nvSpPr>
+        <p:spPr>
+          <a:xfrm>
+            <a:off x="668741" y="2124879"/>
+            <a:ext cx="2061811" cy="307777"/>
+          </a:xfrm>
+          <a:prstGeom prst="rect">
+            <a:avLst/>
+          </a:prstGeom>
+          <a:noFill/>
+        </p:spPr>
+        <p:txBody>
+          <a:bodyPr wrap="square" rtlCol="0">
+            <a:spAutoFit/>
+          </a:bodyPr>
+          <a:lstStyle/>
+          <a:p>
+            <a:r>
+              <a:rPr lang="pt-BR" dirty="0" smtClean="0">
+                <a:solidFill>
+                  <a:schemeClr val="bg1"/>
+                </a:solidFill>
+              </a:rPr>
+              <a:t>Internet Banking - </a:t>
+            </a:r>
+            <a:r>
+              <a:rPr lang="pt-BR" dirty="0" err="1" smtClean="0">
+                <a:solidFill>
+                  <a:schemeClr val="bg1"/>
+                </a:solidFill>
+              </a:rPr>
+              <a:t>App</a:t>
+            </a:r>
+            <a:endParaRPr lang="pt-BR" dirty="0">
+              <a:solidFill>
+                <a:schemeClr val="bg1"/>
+              </a:solidFill>
+            </a:endParaRPr>
+          </a:p>
+        </p:txBody>
+      </p:sp>
+      <p:sp>
+        <p:nvSpPr>
+          <p:cNvPr id="14" name="CaixaDeTexto 13"/>
+          <p:cNvSpPr txBox="1"/>
+          <p:nvPr/>
+        </p:nvSpPr>
+        <p:spPr>
+          <a:xfrm>
+            <a:off x="1312460" y="2536479"/>
+            <a:ext cx="2061811" cy="307777"/>
+          </a:xfrm>
+          <a:prstGeom prst="rect">
+            <a:avLst/>
+          </a:prstGeom>
+          <a:noFill/>
+        </p:spPr>
+        <p:txBody>
+          <a:bodyPr wrap="square" rtlCol="0">
+            <a:spAutoFit/>
+          </a:bodyPr>
+          <a:lstStyle/>
+          <a:p>
+            <a:r>
+              <a:rPr lang="pt-BR" dirty="0" smtClean="0">
+                <a:solidFill>
+                  <a:schemeClr val="bg1"/>
+                </a:solidFill>
+              </a:rPr>
+              <a:t>Cadastro</a:t>
+            </a:r>
+            <a:endParaRPr lang="pt-BR" dirty="0">
+              <a:solidFill>
+                <a:schemeClr val="bg1"/>
+              </a:solidFill>
+            </a:endParaRPr>
+          </a:p>
+        </p:txBody>
+      </p:sp>
+      <p:sp>
+        <p:nvSpPr>
+          <p:cNvPr id="15" name="CaixaDeTexto 14"/>
+          <p:cNvSpPr txBox="1"/>
+          <p:nvPr/>
+        </p:nvSpPr>
+        <p:spPr>
+          <a:xfrm>
+            <a:off x="1312459" y="2936002"/>
+            <a:ext cx="2061811" cy="307777"/>
+          </a:xfrm>
+          <a:prstGeom prst="rect">
+            <a:avLst/>
+          </a:prstGeom>
+          <a:noFill/>
+        </p:spPr>
+        <p:txBody>
+          <a:bodyPr wrap="square" rtlCol="0">
+            <a:spAutoFit/>
+          </a:bodyPr>
+          <a:lstStyle/>
+          <a:p>
+            <a:r>
+              <a:rPr lang="pt-BR" dirty="0" err="1" smtClean="0">
+                <a:solidFill>
+                  <a:schemeClr val="bg1"/>
+                </a:solidFill>
+              </a:rPr>
+              <a:t>Login</a:t>
+            </a:r>
+            <a:endParaRPr lang="pt-BR" dirty="0">
+              <a:solidFill>
+                <a:schemeClr val="bg1"/>
+              </a:solidFill>
+            </a:endParaRPr>
+          </a:p>
+        </p:txBody>
+      </p:sp>
+      <p:sp>
+        <p:nvSpPr>
+          <p:cNvPr id="16" name="CaixaDeTexto 15"/>
+          <p:cNvSpPr txBox="1"/>
+          <p:nvPr/>
+        </p:nvSpPr>
+        <p:spPr>
+          <a:xfrm>
+            <a:off x="1312458" y="3329786"/>
+            <a:ext cx="2061811" cy="307777"/>
+          </a:xfrm>
+          <a:prstGeom prst="rect">
+            <a:avLst/>
+          </a:prstGeom>
+          <a:noFill/>
+        </p:spPr>
+        <p:txBody>
+          <a:bodyPr wrap="square" rtlCol="0">
+            <a:spAutoFit/>
+          </a:bodyPr>
+          <a:lstStyle/>
+          <a:p>
+            <a:r>
+              <a:rPr lang="pt-BR" dirty="0" err="1" smtClean="0">
+                <a:solidFill>
+                  <a:schemeClr val="bg1"/>
+                </a:solidFill>
+              </a:rPr>
+              <a:t>Dashboard</a:t>
+            </a:r>
+            <a:endParaRPr lang="pt-BR" dirty="0">
+              <a:solidFill>
+                <a:schemeClr val="bg1"/>
+              </a:solidFill>
+            </a:endParaRPr>
+          </a:p>
+        </p:txBody>
+      </p:sp>
+      <p:sp>
+        <p:nvSpPr>
+          <p:cNvPr id="17" name="CaixaDeTexto 16"/>
+          <p:cNvSpPr txBox="1"/>
+          <p:nvPr/>
+        </p:nvSpPr>
+        <p:spPr>
+          <a:xfrm>
+            <a:off x="1312457" y="3723570"/>
+            <a:ext cx="2061811" cy="307777"/>
+          </a:xfrm>
+          <a:prstGeom prst="rect">
+            <a:avLst/>
+          </a:prstGeom>
+          <a:noFill/>
+        </p:spPr>
+        <p:txBody>
+          <a:bodyPr wrap="square" rtlCol="0">
+            <a:spAutoFit/>
+          </a:bodyPr>
+          <a:lstStyle/>
+          <a:p>
+            <a:r>
+              <a:rPr lang="pt-BR" dirty="0" smtClean="0">
+                <a:solidFill>
+                  <a:schemeClr val="bg1"/>
+                </a:solidFill>
+              </a:rPr>
+              <a:t>Extrato</a:t>
+            </a:r>
+            <a:endParaRPr lang="pt-BR" dirty="0">
+              <a:solidFill>
+                <a:schemeClr val="bg1"/>
+              </a:solidFill>
+            </a:endParaRPr>
+          </a:p>
+        </p:txBody>
+      </p:sp>
+      <p:sp>
+        <p:nvSpPr>
+          <p:cNvPr id="18" name="CaixaDeTexto 17"/>
+          <p:cNvSpPr txBox="1"/>
+          <p:nvPr/>
+        </p:nvSpPr>
+        <p:spPr>
+          <a:xfrm>
+            <a:off x="1312457" y="4135170"/>
+            <a:ext cx="2061811" cy="307777"/>
+          </a:xfrm>
+          <a:prstGeom prst="rect">
+            <a:avLst/>
+          </a:prstGeom>
+          <a:noFill/>
+        </p:spPr>
+        <p:txBody>
+          <a:bodyPr wrap="square" rtlCol="0">
+            <a:spAutoFit/>
+          </a:bodyPr>
+          <a:lstStyle/>
+          <a:p>
+            <a:r>
+              <a:rPr lang="pt-BR" dirty="0" smtClean="0">
+                <a:solidFill>
+                  <a:schemeClr val="bg1"/>
+                </a:solidFill>
+              </a:rPr>
+              <a:t>Transferência</a:t>
+            </a:r>
+            <a:endParaRPr lang="pt-BR" dirty="0">
+              <a:solidFill>
+                <a:schemeClr val="bg1"/>
+              </a:solidFill>
+            </a:endParaRPr>
+          </a:p>
+        </p:txBody>
+      </p:sp>
+      <p:sp>
+        <p:nvSpPr>
+          <p:cNvPr id="19" name="Shape 106"/>
+          <p:cNvSpPr txBox="1"/>
+          <p:nvPr/>
+        </p:nvSpPr>
+        <p:spPr>
+          <a:xfrm>
+            <a:off x="600501" y="1154227"/>
+            <a:ext cx="3821372" cy="601897"/>
+          </a:xfrm>
+          <a:prstGeom prst="rect">
+            <a:avLst/>
+          </a:prstGeom>
+          <a:noFill/>
+          <a:ln>
+            <a:noFill/>
+          </a:ln>
+        </p:spPr>
+        <p:txBody>
+          <a:bodyPr spcFirstLastPara="1" wrap="square" lIns="82925" tIns="41450" rIns="82925" bIns="41450" anchor="t" anchorCtr="0">
+            <a:noAutofit/>
+          </a:bodyPr>
+          <a:lstStyle/>
+          <a:p>
+            <a:pPr marL="0" marR="0" lvl="1" indent="0" rtl="0">
+              <a:lnSpc>
+                <a:spcPct val="100000"/>
+              </a:lnSpc>
+              <a:spcBef>
+                <a:spcPts val="0"/>
+              </a:spcBef>
+              <a:spcAft>
+                <a:spcPts val="0"/>
+              </a:spcAft>
+              <a:buClr>
+                <a:schemeClr val="lt1"/>
+              </a:buClr>
+              <a:buFont typeface="Arial"/>
+              <a:buNone/>
+            </a:pPr>
+            <a:r>
+              <a:rPr lang="pt-BR" sz="2800" b="1" dirty="0" smtClean="0">
+                <a:solidFill>
+                  <a:schemeClr val="lt1"/>
+                </a:solidFill>
+                <a:latin typeface="Roboto"/>
+                <a:ea typeface="Roboto"/>
+                <a:cs typeface="Roboto"/>
+                <a:sym typeface="Roboto"/>
+              </a:rPr>
+              <a:t>Desenvolvimento API</a:t>
+            </a:r>
+            <a:endParaRPr sz="2800" b="1" dirty="0">
+              <a:solidFill>
+                <a:schemeClr val="lt1"/>
+              </a:solidFill>
+              <a:latin typeface="Roboto"/>
+              <a:ea typeface="Roboto"/>
+              <a:cs typeface="Roboto"/>
+              <a:sym typeface="Roboto"/>
+            </a:endParaRPr>
+          </a:p>
+        </p:txBody>
+      </p:sp>
+      <p:cxnSp>
+        <p:nvCxnSpPr>
+          <p:cNvPr id="20" name="Shape 104"/>
+          <p:cNvCxnSpPr/>
+          <p:nvPr/>
+        </p:nvCxnSpPr>
+        <p:spPr>
+          <a:xfrm>
+            <a:off x="4588371" y="1231837"/>
+            <a:ext cx="95376" cy="4582109"/>
+          </a:xfrm>
+          <a:prstGeom prst="straightConnector1">
+            <a:avLst/>
+          </a:prstGeom>
+          <a:noFill/>
+          <a:ln w="19050" cap="flat" cmpd="sng">
+            <a:solidFill>
+              <a:srgbClr val="FFFFFF"/>
+            </a:solidFill>
+            <a:prstDash val="solid"/>
+            <a:round/>
+            <a:headEnd type="none" w="med" len="med"/>
+            <a:tailEnd type="none" w="med" len="med"/>
+          </a:ln>
+        </p:spPr>
+      </p:cxnSp>
+      <p:sp>
+        <p:nvSpPr>
+          <p:cNvPr id="21" name="CaixaDeTexto 20"/>
+          <p:cNvSpPr txBox="1"/>
+          <p:nvPr/>
+        </p:nvSpPr>
+        <p:spPr>
+          <a:xfrm>
+            <a:off x="5076968" y="2124878"/>
+            <a:ext cx="3179927" cy="307777"/>
+          </a:xfrm>
+          <a:prstGeom prst="rect">
+            <a:avLst/>
+          </a:prstGeom>
+          <a:noFill/>
+        </p:spPr>
+        <p:txBody>
+          <a:bodyPr wrap="square" rtlCol="0">
+            <a:spAutoFit/>
+          </a:bodyPr>
+          <a:lstStyle/>
+          <a:p>
+            <a:pPr algn="r"/>
+            <a:r>
+              <a:rPr lang="pt-BR" dirty="0" err="1" smtClean="0">
+                <a:solidFill>
+                  <a:schemeClr val="bg1"/>
+                </a:solidFill>
+              </a:rPr>
+              <a:t>MongoDB</a:t>
+            </a:r>
+            <a:r>
+              <a:rPr lang="pt-BR" dirty="0" smtClean="0">
+                <a:solidFill>
+                  <a:schemeClr val="bg1"/>
+                </a:solidFill>
+              </a:rPr>
+              <a:t> 3+</a:t>
+            </a:r>
+            <a:endParaRPr lang="pt-BR" dirty="0">
+              <a:solidFill>
+                <a:schemeClr val="bg1"/>
+              </a:solidFill>
+            </a:endParaRPr>
+          </a:p>
+        </p:txBody>
+      </p:sp>
+    </p:spTree>
+    <p:extLst>
+      <p:ext uri="{BB962C8B-B14F-4D97-AF65-F5344CB8AC3E}">
+        <p14:creationId xmlns:p14="http://schemas.microsoft.com/office/powerpoint/2010/main" val="2760489110"/>
+      </p:ext>
+    </p:extLst>
+  </p:cSld>
+  <p:clrMapOvr>
+    <a:masterClrMapping/>
+  </p:clrMapOvr>
+</p:sld>
+</file>
+
+<file path=ppt/slides/slide6.xml><?xml version="1.0" encoding="utf-8"?>
 <p:sld xmlns:a="http://schemas.openxmlformats.org/drawingml/2006/main" xmlns:r="http://schemas.openxmlformats.org/officeDocument/2006/relationships" xmlns:p="http://schemas.openxmlformats.org/presentationml/2006/main">
   <p:cSld>
     <p:spTree>
@@ -14458,7 +15415,7 @@
 </p:sld>
 </file>
 
-<file path=ppt/slides/slide6.xml><?xml version="1.0" encoding="utf-8"?>
+<file path=ppt/slides/slide7.xml><?xml version="1.0" encoding="utf-8"?>
 <p:sld xmlns:a="http://schemas.openxmlformats.org/drawingml/2006/main" xmlns:r="http://schemas.openxmlformats.org/officeDocument/2006/relationships" xmlns:p="http://schemas.openxmlformats.org/presentationml/2006/main">
   <p:cSld>
     <p:spTree>

</xml_diff>